<commit_message>
Update Why Scientific Notation.pptx
</commit_message>
<xml_diff>
--- a/Unit 1 Measurement Skills/Day 3 Scientific Notation/Why Scientific Notation.pptx
+++ b/Unit 1 Measurement Skills/Day 3 Scientific Notation/Why Scientific Notation.pptx
@@ -112,7 +112,7 @@
   </p:defaultTextStyle>
   <p:extLst>
     <p:ext uri="{EFAFB233-063F-42B5-8137-9DF3F51BA10A}">
-      <p15:sldGuideLst xmlns:p15="http://schemas.microsoft.com/office/powerpoint/2012/main" xmlns="">
+      <p15:sldGuideLst xmlns:p15="http://schemas.microsoft.com/office/powerpoint/2012/main">
         <p15:guide id="1" orient="horz" pos="2160">
           <p15:clr>
             <a:srgbClr val="A4A3A4"/>
@@ -309,7 +309,7 @@
             <a:fld id="{1D8BD707-D9CF-40AE-B4C6-C98DA3205C09}" type="datetimeFigureOut">
               <a:rPr lang="en-US" smtClean="0"/>
               <a:pPr/>
-              <a:t>2/10/2019</a:t>
+              <a:t>2/5/2020</a:t>
             </a:fld>
             <a:endParaRPr lang="en-US"/>
           </a:p>
@@ -474,7 +474,7 @@
             <a:fld id="{1D8BD707-D9CF-40AE-B4C6-C98DA3205C09}" type="datetimeFigureOut">
               <a:rPr lang="en-US" smtClean="0"/>
               <a:pPr/>
-              <a:t>2/10/2019</a:t>
+              <a:t>2/5/2020</a:t>
             </a:fld>
             <a:endParaRPr lang="en-US"/>
           </a:p>
@@ -649,7 +649,7 @@
             <a:fld id="{1D8BD707-D9CF-40AE-B4C6-C98DA3205C09}" type="datetimeFigureOut">
               <a:rPr lang="en-US" smtClean="0"/>
               <a:pPr/>
-              <a:t>2/10/2019</a:t>
+              <a:t>2/5/2020</a:t>
             </a:fld>
             <a:endParaRPr lang="en-US"/>
           </a:p>
@@ -814,7 +814,7 @@
             <a:fld id="{1D8BD707-D9CF-40AE-B4C6-C98DA3205C09}" type="datetimeFigureOut">
               <a:rPr lang="en-US" smtClean="0"/>
               <a:pPr/>
-              <a:t>2/10/2019</a:t>
+              <a:t>2/5/2020</a:t>
             </a:fld>
             <a:endParaRPr lang="en-US"/>
           </a:p>
@@ -1056,7 +1056,7 @@
             <a:fld id="{1D8BD707-D9CF-40AE-B4C6-C98DA3205C09}" type="datetimeFigureOut">
               <a:rPr lang="en-US" smtClean="0"/>
               <a:pPr/>
-              <a:t>2/10/2019</a:t>
+              <a:t>2/5/2020</a:t>
             </a:fld>
             <a:endParaRPr lang="en-US"/>
           </a:p>
@@ -1338,7 +1338,7 @@
             <a:fld id="{1D8BD707-D9CF-40AE-B4C6-C98DA3205C09}" type="datetimeFigureOut">
               <a:rPr lang="en-US" smtClean="0"/>
               <a:pPr/>
-              <a:t>2/10/2019</a:t>
+              <a:t>2/5/2020</a:t>
             </a:fld>
             <a:endParaRPr lang="en-US"/>
           </a:p>
@@ -1754,7 +1754,7 @@
             <a:fld id="{1D8BD707-D9CF-40AE-B4C6-C98DA3205C09}" type="datetimeFigureOut">
               <a:rPr lang="en-US" smtClean="0"/>
               <a:pPr/>
-              <a:t>2/10/2019</a:t>
+              <a:t>2/5/2020</a:t>
             </a:fld>
             <a:endParaRPr lang="en-US"/>
           </a:p>
@@ -1868,7 +1868,7 @@
             <a:fld id="{1D8BD707-D9CF-40AE-B4C6-C98DA3205C09}" type="datetimeFigureOut">
               <a:rPr lang="en-US" smtClean="0"/>
               <a:pPr/>
-              <a:t>2/10/2019</a:t>
+              <a:t>2/5/2020</a:t>
             </a:fld>
             <a:endParaRPr lang="en-US"/>
           </a:p>
@@ -1960,7 +1960,7 @@
             <a:fld id="{1D8BD707-D9CF-40AE-B4C6-C98DA3205C09}" type="datetimeFigureOut">
               <a:rPr lang="en-US" smtClean="0"/>
               <a:pPr/>
-              <a:t>2/10/2019</a:t>
+              <a:t>2/5/2020</a:t>
             </a:fld>
             <a:endParaRPr lang="en-US"/>
           </a:p>
@@ -2232,7 +2232,7 @@
             <a:fld id="{1D8BD707-D9CF-40AE-B4C6-C98DA3205C09}" type="datetimeFigureOut">
               <a:rPr lang="en-US" smtClean="0"/>
               <a:pPr/>
-              <a:t>2/10/2019</a:t>
+              <a:t>2/5/2020</a:t>
             </a:fld>
             <a:endParaRPr lang="en-US"/>
           </a:p>
@@ -2481,7 +2481,7 @@
             <a:fld id="{1D8BD707-D9CF-40AE-B4C6-C98DA3205C09}" type="datetimeFigureOut">
               <a:rPr lang="en-US" smtClean="0"/>
               <a:pPr/>
-              <a:t>2/10/2019</a:t>
+              <a:t>2/5/2020</a:t>
             </a:fld>
             <a:endParaRPr lang="en-US"/>
           </a:p>
@@ -2689,7 +2689,7 @@
             <a:fld id="{1D8BD707-D9CF-40AE-B4C6-C98DA3205C09}" type="datetimeFigureOut">
               <a:rPr lang="en-US" smtClean="0"/>
               <a:pPr/>
-              <a:t>2/10/2019</a:t>
+              <a:t>2/5/2020</a:t>
             </a:fld>
             <a:endParaRPr lang="en-US"/>
           </a:p>
@@ -3106,7 +3106,7 @@
             </a:pPr>
             <a:r>
               <a:rPr lang="en-CA" sz="5400" dirty="0" smtClean="0"/>
-              <a:t>32.5</a:t>
+              <a:t>32.4</a:t>
             </a:r>
             <a:endParaRPr lang="en-CA" sz="5400" dirty="0"/>
           </a:p>
@@ -3127,7 +3127,7 @@
     </p:spTree>
     <p:extLst>
       <p:ext uri="{BB962C8B-B14F-4D97-AF65-F5344CB8AC3E}">
-        <p14:creationId xmlns:p14="http://schemas.microsoft.com/office/powerpoint/2010/main" xmlns="" val="2233264456"/>
+        <p14:creationId xmlns:p14="http://schemas.microsoft.com/office/powerpoint/2010/main" val="2233264456"/>
       </p:ext>
     </p:extLst>
   </p:cSld>
@@ -3200,7 +3200,7 @@
             </a:pPr>
             <a:r>
               <a:rPr lang="en-CA" sz="5400" dirty="0" smtClean="0"/>
-              <a:t>32.5</a:t>
+              <a:t>32.4</a:t>
             </a:r>
             <a:endParaRPr lang="en-CA" sz="5400" dirty="0"/>
           </a:p>
@@ -3228,7 +3228,7 @@
     </p:spTree>
     <p:extLst>
       <p:ext uri="{BB962C8B-B14F-4D97-AF65-F5344CB8AC3E}">
-        <p14:creationId xmlns:p14="http://schemas.microsoft.com/office/powerpoint/2010/main" xmlns="" val="3642919268"/>
+        <p14:creationId xmlns:p14="http://schemas.microsoft.com/office/powerpoint/2010/main" val="3642919268"/>
       </p:ext>
     </p:extLst>
   </p:cSld>
@@ -3322,7 +3322,7 @@
     </p:spTree>
     <p:extLst>
       <p:ext uri="{BB962C8B-B14F-4D97-AF65-F5344CB8AC3E}">
-        <p14:creationId xmlns:p14="http://schemas.microsoft.com/office/powerpoint/2010/main" xmlns="" val="602955278"/>
+        <p14:creationId xmlns:p14="http://schemas.microsoft.com/office/powerpoint/2010/main" val="602955278"/>
       </p:ext>
     </p:extLst>
   </p:cSld>
@@ -3423,7 +3423,7 @@
     </p:spTree>
     <p:extLst>
       <p:ext uri="{BB962C8B-B14F-4D97-AF65-F5344CB8AC3E}">
-        <p14:creationId xmlns:p14="http://schemas.microsoft.com/office/powerpoint/2010/main" xmlns="" val="3374782849"/>
+        <p14:creationId xmlns:p14="http://schemas.microsoft.com/office/powerpoint/2010/main" val="3374782849"/>
       </p:ext>
     </p:extLst>
   </p:cSld>
@@ -3517,7 +3517,7 @@
     </p:spTree>
     <p:extLst>
       <p:ext uri="{BB962C8B-B14F-4D97-AF65-F5344CB8AC3E}">
-        <p14:creationId xmlns:p14="http://schemas.microsoft.com/office/powerpoint/2010/main" xmlns="" val="863927083"/>
+        <p14:creationId xmlns:p14="http://schemas.microsoft.com/office/powerpoint/2010/main" val="863927083"/>
       </p:ext>
     </p:extLst>
   </p:cSld>
@@ -3610,7 +3610,7 @@
     </p:spTree>
     <p:extLst>
       <p:ext uri="{BB962C8B-B14F-4D97-AF65-F5344CB8AC3E}">
-        <p14:creationId xmlns:p14="http://schemas.microsoft.com/office/powerpoint/2010/main" xmlns="" val="2268562712"/>
+        <p14:creationId xmlns:p14="http://schemas.microsoft.com/office/powerpoint/2010/main" val="2268562712"/>
       </p:ext>
     </p:extLst>
   </p:cSld>
@@ -3733,7 +3733,7 @@
     </p:spTree>
     <p:extLst>
       <p:ext uri="{BB962C8B-B14F-4D97-AF65-F5344CB8AC3E}">
-        <p14:creationId xmlns:p14="http://schemas.microsoft.com/office/powerpoint/2010/main" xmlns="" val="3070051562"/>
+        <p14:creationId xmlns:p14="http://schemas.microsoft.com/office/powerpoint/2010/main" val="3070051562"/>
       </p:ext>
     </p:extLst>
   </p:cSld>

</xml_diff>